<commit_message>
docs($design): add new design for result page
</commit_message>
<xml_diff>
--- a/Frontend/design/OSS_project_design.pptx
+++ b/Frontend/design/OSS_project_design.pptx
@@ -5,13 +5,16 @@
     <p:sldMasterId id="2147483648" r:id="rId1"/>
   </p:sldMasterIdLst>
   <p:notesMasterIdLst>
-    <p:notesMasterId r:id="rId6"/>
+    <p:notesMasterId r:id="rId9"/>
   </p:notesMasterIdLst>
   <p:sldIdLst>
     <p:sldId id="257" r:id="rId2"/>
     <p:sldId id="258" r:id="rId3"/>
     <p:sldId id="259" r:id="rId4"/>
-    <p:sldId id="260" r:id="rId5"/>
+    <p:sldId id="263" r:id="rId5"/>
+    <p:sldId id="260" r:id="rId6"/>
+    <p:sldId id="261" r:id="rId7"/>
+    <p:sldId id="262" r:id="rId8"/>
   </p:sldIdLst>
   <p:sldSz cx="12192000" cy="6858000"/>
   <p:notesSz cx="6858000" cy="9144000"/>
@@ -110,6 +113,11 @@
       </a:defRPr>
     </a:lvl9pPr>
   </p:defaultTextStyle>
+  <p:extLst>
+    <p:ext uri="{EFAFB233-063F-42B5-8137-9DF3F51BA10A}">
+      <p15:sldGuideLst xmlns:p15="http://schemas.microsoft.com/office/powerpoint/2012/main"/>
+    </p:ext>
+  </p:extLst>
 </p:presentation>
 </file>
 
@@ -249,7 +257,7 @@
           <a:p>
             <a:fld id="{E92E090E-5864-4EB0-9DD1-A14ECBC50BB9}" type="datetimeFigureOut">
               <a:rPr lang="ko-KR" altLang="en-US" smtClean="0"/>
-              <a:t>2022-11-17</a:t>
+              <a:t>2022-11-21</a:t>
             </a:fld>
             <a:endParaRPr lang="ko-KR" altLang="en-US"/>
           </a:p>
@@ -747,7 +755,7 @@
           <a:p>
             <a:fld id="{12B04E6D-57C1-48D6-A6D0-D39B455DAAA9}" type="datetimeFigureOut">
               <a:rPr lang="ko-KR" altLang="en-US" smtClean="0"/>
-              <a:t>2022-11-17</a:t>
+              <a:t>2022-11-21</a:t>
             </a:fld>
             <a:endParaRPr lang="ko-KR" altLang="en-US"/>
           </a:p>
@@ -945,7 +953,7 @@
           <a:p>
             <a:fld id="{12B04E6D-57C1-48D6-A6D0-D39B455DAAA9}" type="datetimeFigureOut">
               <a:rPr lang="ko-KR" altLang="en-US" smtClean="0"/>
-              <a:t>2022-11-17</a:t>
+              <a:t>2022-11-21</a:t>
             </a:fld>
             <a:endParaRPr lang="ko-KR" altLang="en-US"/>
           </a:p>
@@ -1153,7 +1161,7 @@
           <a:p>
             <a:fld id="{12B04E6D-57C1-48D6-A6D0-D39B455DAAA9}" type="datetimeFigureOut">
               <a:rPr lang="ko-KR" altLang="en-US" smtClean="0"/>
-              <a:t>2022-11-17</a:t>
+              <a:t>2022-11-21</a:t>
             </a:fld>
             <a:endParaRPr lang="ko-KR" altLang="en-US"/>
           </a:p>
@@ -1351,7 +1359,7 @@
           <a:p>
             <a:fld id="{12B04E6D-57C1-48D6-A6D0-D39B455DAAA9}" type="datetimeFigureOut">
               <a:rPr lang="ko-KR" altLang="en-US" smtClean="0"/>
-              <a:t>2022-11-17</a:t>
+              <a:t>2022-11-21</a:t>
             </a:fld>
             <a:endParaRPr lang="ko-KR" altLang="en-US"/>
           </a:p>
@@ -1626,7 +1634,7 @@
           <a:p>
             <a:fld id="{12B04E6D-57C1-48D6-A6D0-D39B455DAAA9}" type="datetimeFigureOut">
               <a:rPr lang="ko-KR" altLang="en-US" smtClean="0"/>
-              <a:t>2022-11-17</a:t>
+              <a:t>2022-11-21</a:t>
             </a:fld>
             <a:endParaRPr lang="ko-KR" altLang="en-US"/>
           </a:p>
@@ -1891,7 +1899,7 @@
           <a:p>
             <a:fld id="{12B04E6D-57C1-48D6-A6D0-D39B455DAAA9}" type="datetimeFigureOut">
               <a:rPr lang="ko-KR" altLang="en-US" smtClean="0"/>
-              <a:t>2022-11-17</a:t>
+              <a:t>2022-11-21</a:t>
             </a:fld>
             <a:endParaRPr lang="ko-KR" altLang="en-US"/>
           </a:p>
@@ -2303,7 +2311,7 @@
           <a:p>
             <a:fld id="{12B04E6D-57C1-48D6-A6D0-D39B455DAAA9}" type="datetimeFigureOut">
               <a:rPr lang="ko-KR" altLang="en-US" smtClean="0"/>
-              <a:t>2022-11-17</a:t>
+              <a:t>2022-11-21</a:t>
             </a:fld>
             <a:endParaRPr lang="ko-KR" altLang="en-US"/>
           </a:p>
@@ -2444,7 +2452,7 @@
           <a:p>
             <a:fld id="{12B04E6D-57C1-48D6-A6D0-D39B455DAAA9}" type="datetimeFigureOut">
               <a:rPr lang="ko-KR" altLang="en-US" smtClean="0"/>
-              <a:t>2022-11-17</a:t>
+              <a:t>2022-11-21</a:t>
             </a:fld>
             <a:endParaRPr lang="ko-KR" altLang="en-US"/>
           </a:p>
@@ -2557,7 +2565,7 @@
           <a:p>
             <a:fld id="{12B04E6D-57C1-48D6-A6D0-D39B455DAAA9}" type="datetimeFigureOut">
               <a:rPr lang="ko-KR" altLang="en-US" smtClean="0"/>
-              <a:t>2022-11-17</a:t>
+              <a:t>2022-11-21</a:t>
             </a:fld>
             <a:endParaRPr lang="ko-KR" altLang="en-US"/>
           </a:p>
@@ -2868,7 +2876,7 @@
           <a:p>
             <a:fld id="{12B04E6D-57C1-48D6-A6D0-D39B455DAAA9}" type="datetimeFigureOut">
               <a:rPr lang="ko-KR" altLang="en-US" smtClean="0"/>
-              <a:t>2022-11-17</a:t>
+              <a:t>2022-11-21</a:t>
             </a:fld>
             <a:endParaRPr lang="ko-KR" altLang="en-US"/>
           </a:p>
@@ -3156,7 +3164,7 @@
           <a:p>
             <a:fld id="{12B04E6D-57C1-48D6-A6D0-D39B455DAAA9}" type="datetimeFigureOut">
               <a:rPr lang="ko-KR" altLang="en-US" smtClean="0"/>
-              <a:t>2022-11-17</a:t>
+              <a:t>2022-11-21</a:t>
             </a:fld>
             <a:endParaRPr lang="ko-KR" altLang="en-US"/>
           </a:p>
@@ -3397,7 +3405,7 @@
           <a:p>
             <a:fld id="{12B04E6D-57C1-48D6-A6D0-D39B455DAAA9}" type="datetimeFigureOut">
               <a:rPr lang="ko-KR" altLang="en-US" smtClean="0"/>
-              <a:t>2022-11-17</a:t>
+              <a:t>2022-11-21</a:t>
             </a:fld>
             <a:endParaRPr lang="ko-KR" altLang="en-US"/>
           </a:p>
@@ -4123,6 +4131,15 @@
               <a:rPr lang="ko-KR" altLang="en-US" dirty="0"/>
               <a:t>측정 결과</a:t>
             </a:r>
+            <a:r>
+              <a:rPr lang="ko-KR" altLang="en-US" dirty="0">
+                <a:solidFill>
+                  <a:srgbClr val="FF0000"/>
+                </a:solidFill>
+              </a:rPr>
+              <a:t> </a:t>
+            </a:r>
+            <a:endParaRPr lang="ko-KR" altLang="en-US" dirty="0"/>
           </a:p>
         </p:txBody>
       </p:sp>
@@ -4239,7 +4256,7 @@
         </p:nvSpPr>
         <p:spPr>
           <a:xfrm>
-            <a:off x="2517646" y="5643852"/>
+            <a:off x="2517646" y="5432606"/>
             <a:ext cx="7156704" cy="461665"/>
           </a:xfrm>
           <a:prstGeom prst="rect">
@@ -4255,12 +4272,8 @@
           <a:p>
             <a:pPr algn="ctr"/>
             <a:r>
-              <a:rPr lang="ko-KR" altLang="en-US" sz="2400" dirty="0" err="1"/>
-              <a:t>남은게</a:t>
-            </a:r>
-            <a:r>
               <a:rPr lang="ko-KR" altLang="en-US" sz="2400" dirty="0"/>
-              <a:t> 없습니다</a:t>
+              <a:t>가망이 없습니다</a:t>
             </a:r>
             <a:r>
               <a:rPr lang="en-US" altLang="ko-KR" sz="2400" dirty="0"/>
@@ -4278,8 +4291,8 @@
           </a:p>
         </p:txBody>
       </p:sp>
-      <mc:AlternateContent xmlns:mc="http://schemas.openxmlformats.org/markup-compatibility/2006">
-        <mc:Choice xmlns:p14="http://schemas.microsoft.com/office/powerpoint/2010/main" Requires="p14">
+      <mc:AlternateContent xmlns:mc="http://schemas.openxmlformats.org/markup-compatibility/2006" xmlns:p14="http://schemas.microsoft.com/office/powerpoint/2010/main">
+        <mc:Choice Requires="p14">
           <p:contentPart p14:bwMode="auto" r:id="rId4">
             <p14:nvContentPartPr>
               <p14:cNvPr id="7" name="잉크 6">
@@ -4298,7 +4311,7 @@
             </p14:xfrm>
           </p:contentPart>
         </mc:Choice>
-        <mc:Fallback>
+        <mc:Fallback xmlns="">
           <p:pic>
             <p:nvPicPr>
               <p:cNvPr id="7" name="잉크 6">
@@ -4329,8 +4342,8 @@
           </p:pic>
         </mc:Fallback>
       </mc:AlternateContent>
-      <mc:AlternateContent xmlns:mc="http://schemas.openxmlformats.org/markup-compatibility/2006">
-        <mc:Choice xmlns:p14="http://schemas.microsoft.com/office/powerpoint/2010/main" Requires="p14">
+      <mc:AlternateContent xmlns:mc="http://schemas.openxmlformats.org/markup-compatibility/2006" xmlns:p14="http://schemas.microsoft.com/office/powerpoint/2010/main">
+        <mc:Choice Requires="p14">
           <p:contentPart p14:bwMode="auto" r:id="rId6">
             <p14:nvContentPartPr>
               <p14:cNvPr id="8" name="잉크 7">
@@ -4349,7 +4362,7 @@
             </p14:xfrm>
           </p:contentPart>
         </mc:Choice>
-        <mc:Fallback>
+        <mc:Fallback xmlns="">
           <p:pic>
             <p:nvPicPr>
               <p:cNvPr id="8" name="잉크 7">
@@ -4380,6 +4393,179 @@
           </p:pic>
         </mc:Fallback>
       </mc:AlternateContent>
+      <p:sp>
+        <p:nvSpPr>
+          <p:cNvPr id="3" name="TextBox 2">
+            <a:extLst>
+              <a:ext uri="{FF2B5EF4-FFF2-40B4-BE49-F238E27FC236}">
+                <a16:creationId xmlns:a16="http://schemas.microsoft.com/office/drawing/2014/main" id="{A32C33A2-D769-4366-676A-A00C8859EC9A}"/>
+              </a:ext>
+            </a:extLst>
+          </p:cNvPr>
+          <p:cNvSpPr txBox="1"/>
+          <p:nvPr/>
+        </p:nvSpPr>
+        <p:spPr>
+          <a:xfrm>
+            <a:off x="4579495" y="6301750"/>
+            <a:ext cx="3043003" cy="382249"/>
+          </a:xfrm>
+          <a:prstGeom prst="rect">
+            <a:avLst/>
+          </a:prstGeom>
+          <a:solidFill>
+            <a:schemeClr val="accent1"/>
+          </a:solidFill>
+        </p:spPr>
+        <p:txBody>
+          <a:bodyPr wrap="square" rtlCol="0">
+            <a:spAutoFit/>
+          </a:bodyPr>
+          <a:lstStyle/>
+          <a:p>
+            <a:pPr algn="ctr"/>
+            <a:r>
+              <a:rPr lang="ko-KR" altLang="en-US" dirty="0"/>
+              <a:t>결과 상세보기</a:t>
+            </a:r>
+          </a:p>
+        </p:txBody>
+      </p:sp>
+      <p:sp>
+        <p:nvSpPr>
+          <p:cNvPr id="6" name="TextBox 5">
+            <a:extLst>
+              <a:ext uri="{FF2B5EF4-FFF2-40B4-BE49-F238E27FC236}">
+                <a16:creationId xmlns:a16="http://schemas.microsoft.com/office/drawing/2014/main" id="{0BCE8647-F594-AADB-2509-BE058954B143}"/>
+              </a:ext>
+            </a:extLst>
+          </p:cNvPr>
+          <p:cNvSpPr txBox="1"/>
+          <p:nvPr/>
+        </p:nvSpPr>
+        <p:spPr>
+          <a:xfrm>
+            <a:off x="1701580" y="6285146"/>
+            <a:ext cx="2014535" cy="382249"/>
+          </a:xfrm>
+          <a:prstGeom prst="rect">
+            <a:avLst/>
+          </a:prstGeom>
+          <a:solidFill>
+            <a:srgbClr val="0070C0"/>
+          </a:solidFill>
+        </p:spPr>
+        <p:txBody>
+          <a:bodyPr wrap="square" rtlCol="0">
+            <a:spAutoFit/>
+          </a:bodyPr>
+          <a:lstStyle/>
+          <a:p>
+            <a:pPr algn="ctr"/>
+            <a:r>
+              <a:rPr lang="ko-KR" altLang="en-US" dirty="0"/>
+              <a:t>다시하기</a:t>
+            </a:r>
+          </a:p>
+        </p:txBody>
+      </p:sp>
+      <p:sp>
+        <p:nvSpPr>
+          <p:cNvPr id="9" name="TextBox 8">
+            <a:extLst>
+              <a:ext uri="{FF2B5EF4-FFF2-40B4-BE49-F238E27FC236}">
+                <a16:creationId xmlns:a16="http://schemas.microsoft.com/office/drawing/2014/main" id="{8635B3F3-6713-E7CC-4EF4-47E09C307202}"/>
+              </a:ext>
+            </a:extLst>
+          </p:cNvPr>
+          <p:cNvSpPr txBox="1"/>
+          <p:nvPr/>
+        </p:nvSpPr>
+        <p:spPr>
+          <a:xfrm>
+            <a:off x="8485878" y="6301750"/>
+            <a:ext cx="2867922" cy="382249"/>
+          </a:xfrm>
+          <a:prstGeom prst="rect">
+            <a:avLst/>
+          </a:prstGeom>
+          <a:solidFill>
+            <a:schemeClr val="accent1"/>
+          </a:solidFill>
+        </p:spPr>
+        <p:txBody>
+          <a:bodyPr wrap="square" rtlCol="0">
+            <a:spAutoFit/>
+          </a:bodyPr>
+          <a:lstStyle/>
+          <a:p>
+            <a:pPr algn="ctr"/>
+            <a:r>
+              <a:rPr lang="en-US" altLang="ko-KR" dirty="0"/>
+              <a:t>SNS</a:t>
+            </a:r>
+            <a:r>
+              <a:rPr lang="ko-KR" altLang="en-US" dirty="0"/>
+              <a:t>에 풍성함을 자랑하기</a:t>
+            </a:r>
+          </a:p>
+        </p:txBody>
+      </p:sp>
+      <p:sp>
+        <p:nvSpPr>
+          <p:cNvPr id="10" name="TextBox 9">
+            <a:extLst>
+              <a:ext uri="{FF2B5EF4-FFF2-40B4-BE49-F238E27FC236}">
+                <a16:creationId xmlns:a16="http://schemas.microsoft.com/office/drawing/2014/main" id="{1505EDE6-4D26-1A23-FE45-CE15082E1A1E}"/>
+              </a:ext>
+            </a:extLst>
+          </p:cNvPr>
+          <p:cNvSpPr txBox="1"/>
+          <p:nvPr/>
+        </p:nvSpPr>
+        <p:spPr>
+          <a:xfrm>
+            <a:off x="8900473" y="1514714"/>
+            <a:ext cx="2379625" cy="369332"/>
+          </a:xfrm>
+          <a:prstGeom prst="rect">
+            <a:avLst/>
+          </a:prstGeom>
+          <a:noFill/>
+        </p:spPr>
+        <p:txBody>
+          <a:bodyPr wrap="square" rtlCol="0">
+            <a:spAutoFit/>
+          </a:bodyPr>
+          <a:lstStyle/>
+          <a:p>
+            <a:r>
+              <a:rPr lang="ko-KR" altLang="en-US" dirty="0">
+                <a:solidFill>
+                  <a:srgbClr val="FF0000"/>
+                </a:solidFill>
+              </a:rPr>
+              <a:t>사례</a:t>
+            </a:r>
+            <a:r>
+              <a:rPr lang="en-US" altLang="ko-KR" dirty="0">
+                <a:solidFill>
+                  <a:srgbClr val="FF0000"/>
+                </a:solidFill>
+              </a:rPr>
+              <a:t>1: </a:t>
+            </a:r>
+            <a:r>
+              <a:rPr lang="ko-KR" altLang="en-US" dirty="0">
+                <a:solidFill>
+                  <a:srgbClr val="FF0000"/>
+                </a:solidFill>
+              </a:rPr>
+              <a:t>완전탈모</a:t>
+            </a:r>
+          </a:p>
+        </p:txBody>
+      </p:sp>
     </p:spTree>
     <p:extLst>
       <p:ext uri="{BB962C8B-B14F-4D97-AF65-F5344CB8AC3E}">
@@ -4501,7 +4687,7 @@
         </p:nvSpPr>
         <p:spPr>
           <a:xfrm>
-            <a:off x="2517646" y="5643852"/>
+            <a:off x="2517646" y="5441485"/>
             <a:ext cx="7156704" cy="461665"/>
           </a:xfrm>
           <a:prstGeom prst="rect">
@@ -4594,6 +4780,179 @@
           </a:extLst>
         </p:spPr>
       </p:pic>
+      <p:sp>
+        <p:nvSpPr>
+          <p:cNvPr id="3" name="TextBox 2">
+            <a:extLst>
+              <a:ext uri="{FF2B5EF4-FFF2-40B4-BE49-F238E27FC236}">
+                <a16:creationId xmlns:a16="http://schemas.microsoft.com/office/drawing/2014/main" id="{9EEF0703-8462-9470-BF78-904ABD40ABD1}"/>
+              </a:ext>
+            </a:extLst>
+          </p:cNvPr>
+          <p:cNvSpPr txBox="1"/>
+          <p:nvPr/>
+        </p:nvSpPr>
+        <p:spPr>
+          <a:xfrm>
+            <a:off x="4579495" y="6301750"/>
+            <a:ext cx="3043003" cy="382249"/>
+          </a:xfrm>
+          <a:prstGeom prst="rect">
+            <a:avLst/>
+          </a:prstGeom>
+          <a:solidFill>
+            <a:schemeClr val="accent1"/>
+          </a:solidFill>
+        </p:spPr>
+        <p:txBody>
+          <a:bodyPr wrap="square" rtlCol="0">
+            <a:spAutoFit/>
+          </a:bodyPr>
+          <a:lstStyle/>
+          <a:p>
+            <a:pPr algn="ctr"/>
+            <a:r>
+              <a:rPr lang="ko-KR" altLang="en-US" dirty="0"/>
+              <a:t>결과 상세보기</a:t>
+            </a:r>
+          </a:p>
+        </p:txBody>
+      </p:sp>
+      <p:sp>
+        <p:nvSpPr>
+          <p:cNvPr id="6" name="TextBox 5">
+            <a:extLst>
+              <a:ext uri="{FF2B5EF4-FFF2-40B4-BE49-F238E27FC236}">
+                <a16:creationId xmlns:a16="http://schemas.microsoft.com/office/drawing/2014/main" id="{1F5B7A87-6425-D228-9CBE-E03AD58A2F86}"/>
+              </a:ext>
+            </a:extLst>
+          </p:cNvPr>
+          <p:cNvSpPr txBox="1"/>
+          <p:nvPr/>
+        </p:nvSpPr>
+        <p:spPr>
+          <a:xfrm>
+            <a:off x="1701580" y="6285146"/>
+            <a:ext cx="2014535" cy="382249"/>
+          </a:xfrm>
+          <a:prstGeom prst="rect">
+            <a:avLst/>
+          </a:prstGeom>
+          <a:solidFill>
+            <a:srgbClr val="0070C0"/>
+          </a:solidFill>
+        </p:spPr>
+        <p:txBody>
+          <a:bodyPr wrap="square" rtlCol="0">
+            <a:spAutoFit/>
+          </a:bodyPr>
+          <a:lstStyle/>
+          <a:p>
+            <a:pPr algn="ctr"/>
+            <a:r>
+              <a:rPr lang="ko-KR" altLang="en-US" dirty="0"/>
+              <a:t>다시하기</a:t>
+            </a:r>
+          </a:p>
+        </p:txBody>
+      </p:sp>
+      <p:sp>
+        <p:nvSpPr>
+          <p:cNvPr id="7" name="TextBox 6">
+            <a:extLst>
+              <a:ext uri="{FF2B5EF4-FFF2-40B4-BE49-F238E27FC236}">
+                <a16:creationId xmlns:a16="http://schemas.microsoft.com/office/drawing/2014/main" id="{929352EA-9AEB-1C99-5D9E-2E0FA8EC8589}"/>
+              </a:ext>
+            </a:extLst>
+          </p:cNvPr>
+          <p:cNvSpPr txBox="1"/>
+          <p:nvPr/>
+        </p:nvSpPr>
+        <p:spPr>
+          <a:xfrm>
+            <a:off x="8485878" y="6301750"/>
+            <a:ext cx="2867922" cy="382249"/>
+          </a:xfrm>
+          <a:prstGeom prst="rect">
+            <a:avLst/>
+          </a:prstGeom>
+          <a:solidFill>
+            <a:schemeClr val="accent1"/>
+          </a:solidFill>
+        </p:spPr>
+        <p:txBody>
+          <a:bodyPr wrap="square" rtlCol="0">
+            <a:spAutoFit/>
+          </a:bodyPr>
+          <a:lstStyle/>
+          <a:p>
+            <a:pPr algn="ctr"/>
+            <a:r>
+              <a:rPr lang="en-US" altLang="ko-KR" dirty="0"/>
+              <a:t>SNS</a:t>
+            </a:r>
+            <a:r>
+              <a:rPr lang="ko-KR" altLang="en-US" dirty="0"/>
+              <a:t>에 탈모를 자랑하기</a:t>
+            </a:r>
+          </a:p>
+        </p:txBody>
+      </p:sp>
+      <p:sp>
+        <p:nvSpPr>
+          <p:cNvPr id="8" name="TextBox 7">
+            <a:extLst>
+              <a:ext uri="{FF2B5EF4-FFF2-40B4-BE49-F238E27FC236}">
+                <a16:creationId xmlns:a16="http://schemas.microsoft.com/office/drawing/2014/main" id="{E91E72A6-A5F7-1F90-4D55-83AA77E3C926}"/>
+              </a:ext>
+            </a:extLst>
+          </p:cNvPr>
+          <p:cNvSpPr txBox="1"/>
+          <p:nvPr/>
+        </p:nvSpPr>
+        <p:spPr>
+          <a:xfrm>
+            <a:off x="8900473" y="1514714"/>
+            <a:ext cx="2379625" cy="369332"/>
+          </a:xfrm>
+          <a:prstGeom prst="rect">
+            <a:avLst/>
+          </a:prstGeom>
+          <a:noFill/>
+        </p:spPr>
+        <p:txBody>
+          <a:bodyPr wrap="square" rtlCol="0">
+            <a:spAutoFit/>
+          </a:bodyPr>
+          <a:lstStyle/>
+          <a:p>
+            <a:r>
+              <a:rPr lang="ko-KR" altLang="en-US" dirty="0">
+                <a:solidFill>
+                  <a:srgbClr val="FF0000"/>
+                </a:solidFill>
+              </a:rPr>
+              <a:t>사례</a:t>
+            </a:r>
+            <a:r>
+              <a:rPr lang="en-US" altLang="ko-KR" dirty="0">
+                <a:solidFill>
+                  <a:srgbClr val="FF0000"/>
+                </a:solidFill>
+              </a:rPr>
+              <a:t>2: </a:t>
+            </a:r>
+            <a:r>
+              <a:rPr lang="ko-KR" altLang="en-US" dirty="0">
+                <a:solidFill>
+                  <a:srgbClr val="FF0000"/>
+                </a:solidFill>
+              </a:rPr>
+              <a:t>중도 탈모</a:t>
+            </a:r>
+          </a:p>
+        </p:txBody>
+      </p:sp>
     </p:spTree>
     <p:extLst>
       <p:ext uri="{BB962C8B-B14F-4D97-AF65-F5344CB8AC3E}">
@@ -4732,6 +5091,335 @@
             <a:pPr algn="ctr"/>
             <a:r>
               <a:rPr lang="ko-KR" altLang="en-US" sz="2400" dirty="0"/>
+              <a:t>탈모의 기운이 느껴집니다</a:t>
+            </a:r>
+            <a:r>
+              <a:rPr lang="en-US" altLang="ko-KR" sz="2400" dirty="0"/>
+              <a:t>…</a:t>
+            </a:r>
+            <a:r>
+              <a:rPr lang="ko-KR" altLang="en-US" sz="2400" dirty="0"/>
+              <a:t>약간 위험할지도</a:t>
+            </a:r>
+            <a:r>
+              <a:rPr lang="en-US" altLang="ko-KR" sz="2400" dirty="0"/>
+              <a:t>?</a:t>
+            </a:r>
+            <a:endParaRPr lang="ko-KR" altLang="en-US" sz="2400" dirty="0"/>
+          </a:p>
+        </p:txBody>
+      </p:sp>
+      <p:sp>
+        <p:nvSpPr>
+          <p:cNvPr id="3" name="TextBox 2">
+            <a:extLst>
+              <a:ext uri="{FF2B5EF4-FFF2-40B4-BE49-F238E27FC236}">
+                <a16:creationId xmlns:a16="http://schemas.microsoft.com/office/drawing/2014/main" id="{A0EE393E-F3D0-6E25-A763-AA9B79207574}"/>
+              </a:ext>
+            </a:extLst>
+          </p:cNvPr>
+          <p:cNvSpPr txBox="1"/>
+          <p:nvPr/>
+        </p:nvSpPr>
+        <p:spPr>
+          <a:xfrm>
+            <a:off x="4579495" y="6301750"/>
+            <a:ext cx="3043003" cy="382249"/>
+          </a:xfrm>
+          <a:prstGeom prst="rect">
+            <a:avLst/>
+          </a:prstGeom>
+          <a:solidFill>
+            <a:schemeClr val="accent1"/>
+          </a:solidFill>
+        </p:spPr>
+        <p:txBody>
+          <a:bodyPr wrap="square" rtlCol="0">
+            <a:spAutoFit/>
+          </a:bodyPr>
+          <a:lstStyle/>
+          <a:p>
+            <a:pPr algn="ctr"/>
+            <a:r>
+              <a:rPr lang="ko-KR" altLang="en-US" dirty="0"/>
+              <a:t>결과 상세보기</a:t>
+            </a:r>
+          </a:p>
+        </p:txBody>
+      </p:sp>
+      <p:sp>
+        <p:nvSpPr>
+          <p:cNvPr id="6" name="TextBox 5">
+            <a:extLst>
+              <a:ext uri="{FF2B5EF4-FFF2-40B4-BE49-F238E27FC236}">
+                <a16:creationId xmlns:a16="http://schemas.microsoft.com/office/drawing/2014/main" id="{2CAE1E14-5A19-E892-FA94-AA025723A173}"/>
+              </a:ext>
+            </a:extLst>
+          </p:cNvPr>
+          <p:cNvSpPr txBox="1"/>
+          <p:nvPr/>
+        </p:nvSpPr>
+        <p:spPr>
+          <a:xfrm>
+            <a:off x="1701580" y="6285146"/>
+            <a:ext cx="2014535" cy="382249"/>
+          </a:xfrm>
+          <a:prstGeom prst="rect">
+            <a:avLst/>
+          </a:prstGeom>
+          <a:solidFill>
+            <a:srgbClr val="0070C0"/>
+          </a:solidFill>
+        </p:spPr>
+        <p:txBody>
+          <a:bodyPr wrap="square" rtlCol="0">
+            <a:spAutoFit/>
+          </a:bodyPr>
+          <a:lstStyle/>
+          <a:p>
+            <a:pPr algn="ctr"/>
+            <a:r>
+              <a:rPr lang="ko-KR" altLang="en-US" dirty="0"/>
+              <a:t>다시하기</a:t>
+            </a:r>
+          </a:p>
+        </p:txBody>
+      </p:sp>
+      <p:sp>
+        <p:nvSpPr>
+          <p:cNvPr id="8" name="TextBox 7">
+            <a:extLst>
+              <a:ext uri="{FF2B5EF4-FFF2-40B4-BE49-F238E27FC236}">
+                <a16:creationId xmlns:a16="http://schemas.microsoft.com/office/drawing/2014/main" id="{2E45B9CE-33E7-2A21-D1F3-FCCC4FB69180}"/>
+              </a:ext>
+            </a:extLst>
+          </p:cNvPr>
+          <p:cNvSpPr txBox="1"/>
+          <p:nvPr/>
+        </p:nvSpPr>
+        <p:spPr>
+          <a:xfrm>
+            <a:off x="8485878" y="6301750"/>
+            <a:ext cx="2867922" cy="382249"/>
+          </a:xfrm>
+          <a:prstGeom prst="rect">
+            <a:avLst/>
+          </a:prstGeom>
+          <a:solidFill>
+            <a:schemeClr val="accent1"/>
+          </a:solidFill>
+        </p:spPr>
+        <p:txBody>
+          <a:bodyPr wrap="square" rtlCol="0">
+            <a:spAutoFit/>
+          </a:bodyPr>
+          <a:lstStyle/>
+          <a:p>
+            <a:pPr algn="ctr"/>
+            <a:r>
+              <a:rPr lang="en-US" altLang="ko-KR" dirty="0"/>
+              <a:t>SNS</a:t>
+            </a:r>
+            <a:r>
+              <a:rPr lang="ko-KR" altLang="en-US" dirty="0"/>
+              <a:t>에 풍성함을 자랑하기</a:t>
+            </a:r>
+          </a:p>
+        </p:txBody>
+      </p:sp>
+      <p:sp>
+        <p:nvSpPr>
+          <p:cNvPr id="9" name="TextBox 8">
+            <a:extLst>
+              <a:ext uri="{FF2B5EF4-FFF2-40B4-BE49-F238E27FC236}">
+                <a16:creationId xmlns:a16="http://schemas.microsoft.com/office/drawing/2014/main" id="{4ECCA9BA-C072-79F1-926A-AC5DFC63E195}"/>
+              </a:ext>
+            </a:extLst>
+          </p:cNvPr>
+          <p:cNvSpPr txBox="1"/>
+          <p:nvPr/>
+        </p:nvSpPr>
+        <p:spPr>
+          <a:xfrm>
+            <a:off x="8900473" y="1514714"/>
+            <a:ext cx="2379625" cy="369332"/>
+          </a:xfrm>
+          <a:prstGeom prst="rect">
+            <a:avLst/>
+          </a:prstGeom>
+          <a:noFill/>
+        </p:spPr>
+        <p:txBody>
+          <a:bodyPr wrap="square" rtlCol="0">
+            <a:spAutoFit/>
+          </a:bodyPr>
+          <a:lstStyle/>
+          <a:p>
+            <a:r>
+              <a:rPr lang="ko-KR" altLang="en-US" dirty="0">
+                <a:solidFill>
+                  <a:srgbClr val="FF0000"/>
+                </a:solidFill>
+              </a:rPr>
+              <a:t>사례</a:t>
+            </a:r>
+            <a:r>
+              <a:rPr lang="en-US" altLang="ko-KR" dirty="0">
+                <a:solidFill>
+                  <a:srgbClr val="FF0000"/>
+                </a:solidFill>
+              </a:rPr>
+              <a:t>3: </a:t>
+            </a:r>
+            <a:r>
+              <a:rPr lang="ko-KR" altLang="en-US" dirty="0">
+                <a:solidFill>
+                  <a:srgbClr val="FF0000"/>
+                </a:solidFill>
+              </a:rPr>
+              <a:t>약한 탈모</a:t>
+            </a:r>
+          </a:p>
+        </p:txBody>
+      </p:sp>
+    </p:spTree>
+    <p:extLst>
+      <p:ext uri="{BB962C8B-B14F-4D97-AF65-F5344CB8AC3E}">
+        <p14:creationId xmlns:p14="http://schemas.microsoft.com/office/powerpoint/2010/main" val="3109770522"/>
+      </p:ext>
+    </p:extLst>
+  </p:cSld>
+  <p:clrMapOvr>
+    <a:masterClrMapping/>
+  </p:clrMapOvr>
+</p:sld>
+</file>
+
+<file path=ppt/slides/slide5.xml><?xml version="1.0" encoding="utf-8"?>
+<p:sld xmlns:a="http://schemas.openxmlformats.org/drawingml/2006/main" xmlns:r="http://schemas.openxmlformats.org/officeDocument/2006/relationships" xmlns:p="http://schemas.openxmlformats.org/presentationml/2006/main">
+  <p:cSld>
+    <p:spTree>
+      <p:nvGrpSpPr>
+        <p:cNvPr id="1" name=""/>
+        <p:cNvGrpSpPr/>
+        <p:nvPr/>
+      </p:nvGrpSpPr>
+      <p:grpSpPr>
+        <a:xfrm>
+          <a:off x="0" y="0"/>
+          <a:ext cx="0" cy="0"/>
+          <a:chOff x="0" y="0"/>
+          <a:chExt cx="0" cy="0"/>
+        </a:xfrm>
+      </p:grpSpPr>
+      <p:sp>
+        <p:nvSpPr>
+          <p:cNvPr id="2" name="제목 1">
+            <a:extLst>
+              <a:ext uri="{FF2B5EF4-FFF2-40B4-BE49-F238E27FC236}">
+                <a16:creationId xmlns:a16="http://schemas.microsoft.com/office/drawing/2014/main" id="{BEB26D50-ADE3-D64A-1697-473BF7834D18}"/>
+              </a:ext>
+            </a:extLst>
+          </p:cNvPr>
+          <p:cNvSpPr>
+            <a:spLocks noGrp="1"/>
+          </p:cNvSpPr>
+          <p:nvPr>
+            <p:ph type="title"/>
+          </p:nvPr>
+        </p:nvSpPr>
+        <p:spPr>
+          <a:xfrm>
+            <a:off x="838200" y="365125"/>
+            <a:ext cx="10515600" cy="436153"/>
+          </a:xfrm>
+        </p:spPr>
+        <p:txBody>
+          <a:bodyPr>
+            <a:normAutofit fontScale="90000"/>
+          </a:bodyPr>
+          <a:lstStyle/>
+          <a:p>
+            <a:pPr algn="ctr"/>
+            <a:r>
+              <a:rPr lang="ko-KR" altLang="en-US" dirty="0"/>
+              <a:t>측정 결과</a:t>
+            </a:r>
+          </a:p>
+        </p:txBody>
+      </p:sp>
+      <p:sp>
+        <p:nvSpPr>
+          <p:cNvPr id="4" name="TextBox 3">
+            <a:extLst>
+              <a:ext uri="{FF2B5EF4-FFF2-40B4-BE49-F238E27FC236}">
+                <a16:creationId xmlns:a16="http://schemas.microsoft.com/office/drawing/2014/main" id="{B145A3C5-8238-F1A4-0168-0937AEC1E2C5}"/>
+              </a:ext>
+            </a:extLst>
+          </p:cNvPr>
+          <p:cNvSpPr txBox="1"/>
+          <p:nvPr/>
+        </p:nvSpPr>
+        <p:spPr>
+          <a:xfrm>
+            <a:off x="3291524" y="1053049"/>
+            <a:ext cx="5608949" cy="461665"/>
+          </a:xfrm>
+          <a:prstGeom prst="rect">
+            <a:avLst/>
+          </a:prstGeom>
+          <a:noFill/>
+        </p:spPr>
+        <p:txBody>
+          <a:bodyPr wrap="square" rtlCol="0">
+            <a:spAutoFit/>
+          </a:bodyPr>
+          <a:lstStyle/>
+          <a:p>
+            <a:pPr algn="ctr"/>
+            <a:r>
+              <a:rPr lang="ko-KR" altLang="en-US" sz="2400" dirty="0"/>
+              <a:t>당신의 모발은</a:t>
+            </a:r>
+            <a:r>
+              <a:rPr lang="en-US" altLang="ko-KR" sz="2400" dirty="0"/>
+              <a:t>…..</a:t>
+            </a:r>
+            <a:endParaRPr lang="ko-KR" altLang="en-US" sz="2400" dirty="0"/>
+          </a:p>
+        </p:txBody>
+      </p:sp>
+      <p:sp>
+        <p:nvSpPr>
+          <p:cNvPr id="5" name="TextBox 4">
+            <a:extLst>
+              <a:ext uri="{FF2B5EF4-FFF2-40B4-BE49-F238E27FC236}">
+                <a16:creationId xmlns:a16="http://schemas.microsoft.com/office/drawing/2014/main" id="{CF3A4163-3D2E-1187-ECDE-AFCBE1049722}"/>
+              </a:ext>
+            </a:extLst>
+          </p:cNvPr>
+          <p:cNvSpPr txBox="1"/>
+          <p:nvPr/>
+        </p:nvSpPr>
+        <p:spPr>
+          <a:xfrm>
+            <a:off x="2517646" y="5643852"/>
+            <a:ext cx="7156704" cy="461665"/>
+          </a:xfrm>
+          <a:prstGeom prst="rect">
+            <a:avLst/>
+          </a:prstGeom>
+          <a:noFill/>
+        </p:spPr>
+        <p:txBody>
+          <a:bodyPr wrap="square" rtlCol="0">
+            <a:spAutoFit/>
+          </a:bodyPr>
+          <a:lstStyle/>
+          <a:p>
+            <a:pPr algn="ctr"/>
+            <a:r>
+              <a:rPr lang="ko-KR" altLang="en-US" sz="2400" dirty="0"/>
               <a:t>풍성합니다</a:t>
             </a:r>
             <a:r>
@@ -4756,7 +5444,7 @@
           </p:cNvPicPr>
           <p:nvPr/>
         </p:nvPicPr>
-        <p:blipFill>
+        <p:blipFill rotWithShape="1">
           <a:blip r:embed="rId2">
             <a:extLst>
               <a:ext uri="{28A0092B-C50C-407E-A947-70E740481C1C}">
@@ -4764,15 +5452,13 @@
               </a:ext>
             </a:extLst>
           </a:blip>
-          <a:srcRect/>
-          <a:stretch>
-            <a:fillRect/>
-          </a:stretch>
+          <a:srcRect l="15644" r="13155"/>
+          <a:stretch/>
         </p:blipFill>
         <p:spPr bwMode="auto">
           <a:xfrm>
-            <a:off x="2852735" y="1755245"/>
-            <a:ext cx="6486525" cy="3648075"/>
+            <a:off x="3867462" y="1755245"/>
+            <a:ext cx="4618416" cy="3648075"/>
           </a:xfrm>
           <a:prstGeom prst="rect">
             <a:avLst/>
@@ -4789,10 +5475,820 @@
           </a:extLst>
         </p:spPr>
       </p:pic>
+      <p:sp>
+        <p:nvSpPr>
+          <p:cNvPr id="3" name="TextBox 2">
+            <a:extLst>
+              <a:ext uri="{FF2B5EF4-FFF2-40B4-BE49-F238E27FC236}">
+                <a16:creationId xmlns:a16="http://schemas.microsoft.com/office/drawing/2014/main" id="{A0EE393E-F3D0-6E25-A763-AA9B79207574}"/>
+              </a:ext>
+            </a:extLst>
+          </p:cNvPr>
+          <p:cNvSpPr txBox="1"/>
+          <p:nvPr/>
+        </p:nvSpPr>
+        <p:spPr>
+          <a:xfrm>
+            <a:off x="4579495" y="6301750"/>
+            <a:ext cx="3043003" cy="382249"/>
+          </a:xfrm>
+          <a:prstGeom prst="rect">
+            <a:avLst/>
+          </a:prstGeom>
+          <a:solidFill>
+            <a:schemeClr val="accent1"/>
+          </a:solidFill>
+        </p:spPr>
+        <p:txBody>
+          <a:bodyPr wrap="square" rtlCol="0">
+            <a:spAutoFit/>
+          </a:bodyPr>
+          <a:lstStyle/>
+          <a:p>
+            <a:pPr algn="ctr"/>
+            <a:r>
+              <a:rPr lang="ko-KR" altLang="en-US" dirty="0"/>
+              <a:t>결과 상세보기</a:t>
+            </a:r>
+          </a:p>
+        </p:txBody>
+      </p:sp>
+      <p:sp>
+        <p:nvSpPr>
+          <p:cNvPr id="6" name="TextBox 5">
+            <a:extLst>
+              <a:ext uri="{FF2B5EF4-FFF2-40B4-BE49-F238E27FC236}">
+                <a16:creationId xmlns:a16="http://schemas.microsoft.com/office/drawing/2014/main" id="{2CAE1E14-5A19-E892-FA94-AA025723A173}"/>
+              </a:ext>
+            </a:extLst>
+          </p:cNvPr>
+          <p:cNvSpPr txBox="1"/>
+          <p:nvPr/>
+        </p:nvSpPr>
+        <p:spPr>
+          <a:xfrm>
+            <a:off x="1701580" y="6285146"/>
+            <a:ext cx="2014535" cy="382249"/>
+          </a:xfrm>
+          <a:prstGeom prst="rect">
+            <a:avLst/>
+          </a:prstGeom>
+          <a:solidFill>
+            <a:srgbClr val="0070C0"/>
+          </a:solidFill>
+        </p:spPr>
+        <p:txBody>
+          <a:bodyPr wrap="square" rtlCol="0">
+            <a:spAutoFit/>
+          </a:bodyPr>
+          <a:lstStyle/>
+          <a:p>
+            <a:pPr algn="ctr"/>
+            <a:r>
+              <a:rPr lang="ko-KR" altLang="en-US" dirty="0"/>
+              <a:t>다시하기</a:t>
+            </a:r>
+          </a:p>
+        </p:txBody>
+      </p:sp>
+      <p:sp>
+        <p:nvSpPr>
+          <p:cNvPr id="8" name="TextBox 7">
+            <a:extLst>
+              <a:ext uri="{FF2B5EF4-FFF2-40B4-BE49-F238E27FC236}">
+                <a16:creationId xmlns:a16="http://schemas.microsoft.com/office/drawing/2014/main" id="{2E45B9CE-33E7-2A21-D1F3-FCCC4FB69180}"/>
+              </a:ext>
+            </a:extLst>
+          </p:cNvPr>
+          <p:cNvSpPr txBox="1"/>
+          <p:nvPr/>
+        </p:nvSpPr>
+        <p:spPr>
+          <a:xfrm>
+            <a:off x="8485878" y="6301750"/>
+            <a:ext cx="2867922" cy="382249"/>
+          </a:xfrm>
+          <a:prstGeom prst="rect">
+            <a:avLst/>
+          </a:prstGeom>
+          <a:solidFill>
+            <a:schemeClr val="accent1"/>
+          </a:solidFill>
+        </p:spPr>
+        <p:txBody>
+          <a:bodyPr wrap="square" rtlCol="0">
+            <a:spAutoFit/>
+          </a:bodyPr>
+          <a:lstStyle/>
+          <a:p>
+            <a:pPr algn="ctr"/>
+            <a:r>
+              <a:rPr lang="en-US" altLang="ko-KR" dirty="0"/>
+              <a:t>SNS</a:t>
+            </a:r>
+            <a:r>
+              <a:rPr lang="ko-KR" altLang="en-US" dirty="0"/>
+              <a:t>에 풍성함을 자랑하기</a:t>
+            </a:r>
+          </a:p>
+        </p:txBody>
+      </p:sp>
+      <p:sp>
+        <p:nvSpPr>
+          <p:cNvPr id="9" name="TextBox 8">
+            <a:extLst>
+              <a:ext uri="{FF2B5EF4-FFF2-40B4-BE49-F238E27FC236}">
+                <a16:creationId xmlns:a16="http://schemas.microsoft.com/office/drawing/2014/main" id="{4ECCA9BA-C072-79F1-926A-AC5DFC63E195}"/>
+              </a:ext>
+            </a:extLst>
+          </p:cNvPr>
+          <p:cNvSpPr txBox="1"/>
+          <p:nvPr/>
+        </p:nvSpPr>
+        <p:spPr>
+          <a:xfrm>
+            <a:off x="8900473" y="1514714"/>
+            <a:ext cx="2379625" cy="369332"/>
+          </a:xfrm>
+          <a:prstGeom prst="rect">
+            <a:avLst/>
+          </a:prstGeom>
+          <a:noFill/>
+        </p:spPr>
+        <p:txBody>
+          <a:bodyPr wrap="square" rtlCol="0">
+            <a:spAutoFit/>
+          </a:bodyPr>
+          <a:lstStyle/>
+          <a:p>
+            <a:r>
+              <a:rPr lang="ko-KR" altLang="en-US" dirty="0">
+                <a:solidFill>
+                  <a:srgbClr val="FF0000"/>
+                </a:solidFill>
+              </a:rPr>
+              <a:t>사례</a:t>
+            </a:r>
+            <a:r>
+              <a:rPr lang="en-US" altLang="ko-KR" dirty="0">
+                <a:solidFill>
+                  <a:srgbClr val="FF0000"/>
+                </a:solidFill>
+              </a:rPr>
+              <a:t>4: </a:t>
+            </a:r>
+            <a:r>
+              <a:rPr lang="ko-KR" altLang="en-US" dirty="0">
+                <a:solidFill>
+                  <a:srgbClr val="FF0000"/>
+                </a:solidFill>
+              </a:rPr>
+              <a:t>완전 풍성</a:t>
+            </a:r>
+          </a:p>
+        </p:txBody>
+      </p:sp>
     </p:spTree>
     <p:extLst>
       <p:ext uri="{BB962C8B-B14F-4D97-AF65-F5344CB8AC3E}">
         <p14:creationId xmlns:p14="http://schemas.microsoft.com/office/powerpoint/2010/main" val="1386213026"/>
+      </p:ext>
+    </p:extLst>
+  </p:cSld>
+  <p:clrMapOvr>
+    <a:masterClrMapping/>
+  </p:clrMapOvr>
+</p:sld>
+</file>
+
+<file path=ppt/slides/slide6.xml><?xml version="1.0" encoding="utf-8"?>
+<p:sld xmlns:a="http://schemas.openxmlformats.org/drawingml/2006/main" xmlns:r="http://schemas.openxmlformats.org/officeDocument/2006/relationships" xmlns:p="http://schemas.openxmlformats.org/presentationml/2006/main">
+  <p:cSld>
+    <p:spTree>
+      <p:nvGrpSpPr>
+        <p:cNvPr id="1" name=""/>
+        <p:cNvGrpSpPr/>
+        <p:nvPr/>
+      </p:nvGrpSpPr>
+      <p:grpSpPr>
+        <a:xfrm>
+          <a:off x="0" y="0"/>
+          <a:ext cx="0" cy="0"/>
+          <a:chOff x="0" y="0"/>
+          <a:chExt cx="0" cy="0"/>
+        </a:xfrm>
+      </p:grpSpPr>
+      <p:sp>
+        <p:nvSpPr>
+          <p:cNvPr id="2" name="제목 1">
+            <a:extLst>
+              <a:ext uri="{FF2B5EF4-FFF2-40B4-BE49-F238E27FC236}">
+                <a16:creationId xmlns:a16="http://schemas.microsoft.com/office/drawing/2014/main" id="{6CF9CA51-A0C6-770B-E429-9F94444BAF29}"/>
+              </a:ext>
+            </a:extLst>
+          </p:cNvPr>
+          <p:cNvSpPr>
+            <a:spLocks noGrp="1"/>
+          </p:cNvSpPr>
+          <p:nvPr>
+            <p:ph type="title"/>
+          </p:nvPr>
+        </p:nvSpPr>
+        <p:spPr/>
+        <p:txBody>
+          <a:bodyPr/>
+          <a:lstStyle/>
+          <a:p>
+            <a:r>
+              <a:rPr lang="en-US" altLang="ko-KR" dirty="0"/>
+              <a:t>-</a:t>
+            </a:r>
+            <a:r>
+              <a:rPr lang="ko-KR" altLang="en-US" dirty="0"/>
+              <a:t>상세 정보</a:t>
+            </a:r>
+          </a:p>
+        </p:txBody>
+      </p:sp>
+      <p:sp>
+        <p:nvSpPr>
+          <p:cNvPr id="3" name="내용 개체 틀 2">
+            <a:extLst>
+              <a:ext uri="{FF2B5EF4-FFF2-40B4-BE49-F238E27FC236}">
+                <a16:creationId xmlns:a16="http://schemas.microsoft.com/office/drawing/2014/main" id="{43805C6F-A263-C184-D924-70E5B65962F8}"/>
+              </a:ext>
+            </a:extLst>
+          </p:cNvPr>
+          <p:cNvSpPr>
+            <a:spLocks noGrp="1"/>
+          </p:cNvSpPr>
+          <p:nvPr>
+            <p:ph idx="1"/>
+          </p:nvPr>
+        </p:nvSpPr>
+        <p:spPr>
+          <a:xfrm>
+            <a:off x="1070548" y="1953015"/>
+            <a:ext cx="2062395" cy="4357843"/>
+          </a:xfrm>
+        </p:spPr>
+        <p:txBody>
+          <a:bodyPr/>
+          <a:lstStyle/>
+          <a:p>
+            <a:r>
+              <a:rPr lang="ko-KR" altLang="en-US" dirty="0"/>
+              <a:t>분류 결과</a:t>
+            </a:r>
+            <a:endParaRPr lang="en-US" altLang="ko-KR" dirty="0"/>
+          </a:p>
+          <a:p>
+            <a:r>
+              <a:rPr lang="en-US" altLang="ko-KR" dirty="0"/>
+              <a:t>1</a:t>
+            </a:r>
+            <a:r>
+              <a:rPr lang="ko-KR" altLang="en-US" dirty="0"/>
+              <a:t>단계</a:t>
+            </a:r>
+            <a:r>
+              <a:rPr lang="en-US" altLang="ko-KR" dirty="0"/>
+              <a:t>: a%</a:t>
+            </a:r>
+          </a:p>
+          <a:p>
+            <a:r>
+              <a:rPr lang="en-US" altLang="ko-KR" dirty="0"/>
+              <a:t>2</a:t>
+            </a:r>
+            <a:r>
+              <a:rPr lang="ko-KR" altLang="en-US" dirty="0"/>
+              <a:t>단계</a:t>
+            </a:r>
+            <a:r>
+              <a:rPr lang="en-US" altLang="ko-KR" dirty="0"/>
+              <a:t>: b%</a:t>
+            </a:r>
+          </a:p>
+          <a:p>
+            <a:r>
+              <a:rPr lang="en-US" altLang="ko-KR" dirty="0"/>
+              <a:t>3</a:t>
+            </a:r>
+            <a:r>
+              <a:rPr lang="ko-KR" altLang="en-US" dirty="0"/>
+              <a:t>단계</a:t>
+            </a:r>
+            <a:r>
+              <a:rPr lang="en-US" altLang="ko-KR" dirty="0"/>
+              <a:t>: c%</a:t>
+            </a:r>
+          </a:p>
+          <a:p>
+            <a:endParaRPr lang="en-US" altLang="ko-KR" dirty="0"/>
+          </a:p>
+          <a:p>
+            <a:endParaRPr lang="ko-KR" altLang="en-US" dirty="0"/>
+          </a:p>
+        </p:txBody>
+      </p:sp>
+      <p:sp>
+        <p:nvSpPr>
+          <p:cNvPr id="4" name="TextBox 3">
+            <a:extLst>
+              <a:ext uri="{FF2B5EF4-FFF2-40B4-BE49-F238E27FC236}">
+                <a16:creationId xmlns:a16="http://schemas.microsoft.com/office/drawing/2014/main" id="{900BA670-5892-E8C5-3C5A-1E86047353A3}"/>
+              </a:ext>
+            </a:extLst>
+          </p:cNvPr>
+          <p:cNvSpPr txBox="1"/>
+          <p:nvPr/>
+        </p:nvSpPr>
+        <p:spPr>
+          <a:xfrm>
+            <a:off x="5343993" y="1424065"/>
+            <a:ext cx="4661941" cy="1477328"/>
+          </a:xfrm>
+          <a:prstGeom prst="rect">
+            <a:avLst/>
+          </a:prstGeom>
+          <a:noFill/>
+        </p:spPr>
+        <p:txBody>
+          <a:bodyPr wrap="square" rtlCol="0">
+            <a:spAutoFit/>
+          </a:bodyPr>
+          <a:lstStyle/>
+          <a:p>
+            <a:r>
+              <a:rPr lang="en-US" altLang="ko-KR" dirty="0"/>
+              <a:t>* </a:t>
+            </a:r>
+            <a:r>
+              <a:rPr lang="ko-KR" altLang="en-US" dirty="0"/>
+              <a:t>당신은 탈모 </a:t>
+            </a:r>
+            <a:r>
+              <a:rPr lang="en-US" altLang="ko-KR" dirty="0"/>
+              <a:t>x</a:t>
+            </a:r>
+            <a:r>
+              <a:rPr lang="ko-KR" altLang="en-US" dirty="0"/>
+              <a:t>단계입니다</a:t>
+            </a:r>
+            <a:r>
+              <a:rPr lang="en-US" altLang="ko-KR" dirty="0"/>
+              <a:t>.</a:t>
+            </a:r>
+          </a:p>
+          <a:p>
+            <a:r>
+              <a:rPr lang="ko-KR" altLang="en-US" dirty="0">
+                <a:solidFill>
+                  <a:srgbClr val="FF0000"/>
+                </a:solidFill>
+              </a:rPr>
+              <a:t>이하 단계별 내용 변경</a:t>
+            </a:r>
+            <a:endParaRPr lang="en-US" altLang="ko-KR" dirty="0">
+              <a:solidFill>
+                <a:srgbClr val="FF0000"/>
+              </a:solidFill>
+            </a:endParaRPr>
+          </a:p>
+          <a:p>
+            <a:r>
+              <a:rPr lang="en-US" altLang="ko-KR" dirty="0"/>
+              <a:t>- </a:t>
+            </a:r>
+            <a:r>
+              <a:rPr lang="ko-KR" altLang="en-US" dirty="0"/>
+              <a:t>예방</a:t>
+            </a:r>
+            <a:r>
+              <a:rPr lang="en-US" altLang="ko-KR" dirty="0"/>
+              <a:t>~~~~</a:t>
+            </a:r>
+          </a:p>
+          <a:p>
+            <a:pPr marL="285750" indent="-285750">
+              <a:buFontTx/>
+              <a:buChar char="-"/>
+            </a:pPr>
+            <a:r>
+              <a:rPr lang="ko-KR" altLang="en-US" dirty="0"/>
+              <a:t>추천 제품 </a:t>
+            </a:r>
+            <a:r>
+              <a:rPr lang="en-US" altLang="ko-KR" dirty="0"/>
+              <a:t>~~~~</a:t>
+            </a:r>
+          </a:p>
+          <a:p>
+            <a:pPr marL="285750" indent="-285750">
+              <a:buFontTx/>
+              <a:buChar char="-"/>
+            </a:pPr>
+            <a:endParaRPr lang="ko-KR" altLang="en-US" dirty="0"/>
+          </a:p>
+        </p:txBody>
+      </p:sp>
+      <p:sp>
+        <p:nvSpPr>
+          <p:cNvPr id="6" name="직사각형 5">
+            <a:extLst>
+              <a:ext uri="{FF2B5EF4-FFF2-40B4-BE49-F238E27FC236}">
+                <a16:creationId xmlns:a16="http://schemas.microsoft.com/office/drawing/2014/main" id="{27E16ABE-BDA6-DBA9-1C11-62178942310C}"/>
+              </a:ext>
+            </a:extLst>
+          </p:cNvPr>
+          <p:cNvSpPr/>
+          <p:nvPr/>
+        </p:nvSpPr>
+        <p:spPr>
+          <a:xfrm>
+            <a:off x="944380" y="4840148"/>
+            <a:ext cx="2510853" cy="1656412"/>
+          </a:xfrm>
+          <a:prstGeom prst="rect">
+            <a:avLst/>
+          </a:prstGeom>
+        </p:spPr>
+        <p:style>
+          <a:lnRef idx="2">
+            <a:schemeClr val="accent1">
+              <a:shade val="50000"/>
+            </a:schemeClr>
+          </a:lnRef>
+          <a:fillRef idx="1">
+            <a:schemeClr val="accent1"/>
+          </a:fillRef>
+          <a:effectRef idx="0">
+            <a:schemeClr val="accent1"/>
+          </a:effectRef>
+          <a:fontRef idx="minor">
+            <a:schemeClr val="lt1"/>
+          </a:fontRef>
+        </p:style>
+        <p:txBody>
+          <a:bodyPr rtlCol="0" anchor="ctr"/>
+          <a:lstStyle/>
+          <a:p>
+            <a:pPr algn="ctr"/>
+            <a:endParaRPr lang="ko-KR" altLang="en-US"/>
+          </a:p>
+        </p:txBody>
+      </p:sp>
+      <p:sp>
+        <p:nvSpPr>
+          <p:cNvPr id="7" name="직사각형 6">
+            <a:extLst>
+              <a:ext uri="{FF2B5EF4-FFF2-40B4-BE49-F238E27FC236}">
+                <a16:creationId xmlns:a16="http://schemas.microsoft.com/office/drawing/2014/main" id="{BC11AA65-A1C5-0D2B-647D-A1CA5A6383A1}"/>
+              </a:ext>
+            </a:extLst>
+          </p:cNvPr>
+          <p:cNvSpPr/>
+          <p:nvPr/>
+        </p:nvSpPr>
+        <p:spPr>
+          <a:xfrm>
+            <a:off x="4609476" y="4840148"/>
+            <a:ext cx="2510853" cy="1656412"/>
+          </a:xfrm>
+          <a:prstGeom prst="rect">
+            <a:avLst/>
+          </a:prstGeom>
+        </p:spPr>
+        <p:style>
+          <a:lnRef idx="2">
+            <a:schemeClr val="accent1">
+              <a:shade val="50000"/>
+            </a:schemeClr>
+          </a:lnRef>
+          <a:fillRef idx="1">
+            <a:schemeClr val="accent1"/>
+          </a:fillRef>
+          <a:effectRef idx="0">
+            <a:schemeClr val="accent1"/>
+          </a:effectRef>
+          <a:fontRef idx="minor">
+            <a:schemeClr val="lt1"/>
+          </a:fontRef>
+        </p:style>
+        <p:txBody>
+          <a:bodyPr rtlCol="0" anchor="ctr"/>
+          <a:lstStyle/>
+          <a:p>
+            <a:pPr algn="ctr"/>
+            <a:endParaRPr lang="ko-KR" altLang="en-US" dirty="0"/>
+          </a:p>
+        </p:txBody>
+      </p:sp>
+      <p:sp>
+        <p:nvSpPr>
+          <p:cNvPr id="8" name="직사각형 7">
+            <a:extLst>
+              <a:ext uri="{FF2B5EF4-FFF2-40B4-BE49-F238E27FC236}">
+                <a16:creationId xmlns:a16="http://schemas.microsoft.com/office/drawing/2014/main" id="{EDCCF515-6E8C-3B0D-84A9-A203C2B8EF49}"/>
+              </a:ext>
+            </a:extLst>
+          </p:cNvPr>
+          <p:cNvSpPr/>
+          <p:nvPr/>
+        </p:nvSpPr>
+        <p:spPr>
+          <a:xfrm>
+            <a:off x="8074702" y="4862634"/>
+            <a:ext cx="2510853" cy="1656412"/>
+          </a:xfrm>
+          <a:prstGeom prst="rect">
+            <a:avLst/>
+          </a:prstGeom>
+        </p:spPr>
+        <p:style>
+          <a:lnRef idx="2">
+            <a:schemeClr val="accent1">
+              <a:shade val="50000"/>
+            </a:schemeClr>
+          </a:lnRef>
+          <a:fillRef idx="1">
+            <a:schemeClr val="accent1"/>
+          </a:fillRef>
+          <a:effectRef idx="0">
+            <a:schemeClr val="accent1"/>
+          </a:effectRef>
+          <a:fontRef idx="minor">
+            <a:schemeClr val="lt1"/>
+          </a:fontRef>
+        </p:style>
+        <p:txBody>
+          <a:bodyPr rtlCol="0" anchor="ctr"/>
+          <a:lstStyle/>
+          <a:p>
+            <a:pPr algn="ctr"/>
+            <a:endParaRPr lang="ko-KR" altLang="en-US"/>
+          </a:p>
+        </p:txBody>
+      </p:sp>
+      <p:sp>
+        <p:nvSpPr>
+          <p:cNvPr id="9" name="TextBox 8">
+            <a:extLst>
+              <a:ext uri="{FF2B5EF4-FFF2-40B4-BE49-F238E27FC236}">
+                <a16:creationId xmlns:a16="http://schemas.microsoft.com/office/drawing/2014/main" id="{B2B2194C-45A4-8A50-3067-F4C060D86C38}"/>
+              </a:ext>
+            </a:extLst>
+          </p:cNvPr>
+          <p:cNvSpPr txBox="1"/>
+          <p:nvPr/>
+        </p:nvSpPr>
+        <p:spPr>
+          <a:xfrm>
+            <a:off x="1716374" y="5520127"/>
+            <a:ext cx="1221698" cy="369332"/>
+          </a:xfrm>
+          <a:prstGeom prst="rect">
+            <a:avLst/>
+          </a:prstGeom>
+          <a:noFill/>
+        </p:spPr>
+        <p:txBody>
+          <a:bodyPr wrap="square" rtlCol="0">
+            <a:spAutoFit/>
+          </a:bodyPr>
+          <a:lstStyle/>
+          <a:p>
+            <a:r>
+              <a:rPr lang="ko-KR" altLang="en-US" dirty="0"/>
+              <a:t>유투브 </a:t>
+            </a:r>
+            <a:r>
+              <a:rPr lang="en-US" altLang="ko-KR" dirty="0"/>
+              <a:t>1</a:t>
+            </a:r>
+            <a:endParaRPr lang="ko-KR" altLang="en-US" dirty="0"/>
+          </a:p>
+        </p:txBody>
+      </p:sp>
+      <p:sp>
+        <p:nvSpPr>
+          <p:cNvPr id="11" name="TextBox 10">
+            <a:extLst>
+              <a:ext uri="{FF2B5EF4-FFF2-40B4-BE49-F238E27FC236}">
+                <a16:creationId xmlns:a16="http://schemas.microsoft.com/office/drawing/2014/main" id="{B83797B3-DFA8-AE23-7C3D-6651B24601D3}"/>
+              </a:ext>
+            </a:extLst>
+          </p:cNvPr>
+          <p:cNvSpPr txBox="1"/>
+          <p:nvPr/>
+        </p:nvSpPr>
+        <p:spPr>
+          <a:xfrm>
+            <a:off x="1004341" y="4234721"/>
+            <a:ext cx="2241029" cy="369332"/>
+          </a:xfrm>
+          <a:prstGeom prst="rect">
+            <a:avLst/>
+          </a:prstGeom>
+          <a:noFill/>
+        </p:spPr>
+        <p:txBody>
+          <a:bodyPr wrap="square" rtlCol="0">
+            <a:spAutoFit/>
+          </a:bodyPr>
+          <a:lstStyle/>
+          <a:p>
+            <a:r>
+              <a:rPr lang="en-US" altLang="ko-KR" dirty="0"/>
+              <a:t>- </a:t>
+            </a:r>
+            <a:r>
+              <a:rPr lang="ko-KR" altLang="en-US" dirty="0"/>
+              <a:t>탈모인 추천영상</a:t>
+            </a:r>
+          </a:p>
+        </p:txBody>
+      </p:sp>
+      <p:sp>
+        <p:nvSpPr>
+          <p:cNvPr id="12" name="TextBox 11">
+            <a:extLst>
+              <a:ext uri="{FF2B5EF4-FFF2-40B4-BE49-F238E27FC236}">
+                <a16:creationId xmlns:a16="http://schemas.microsoft.com/office/drawing/2014/main" id="{4CABC398-5818-751D-3116-4216D2C9A1D4}"/>
+              </a:ext>
+            </a:extLst>
+          </p:cNvPr>
+          <p:cNvSpPr txBox="1"/>
+          <p:nvPr/>
+        </p:nvSpPr>
+        <p:spPr>
+          <a:xfrm>
+            <a:off x="5254053" y="5506174"/>
+            <a:ext cx="1221698" cy="369332"/>
+          </a:xfrm>
+          <a:prstGeom prst="rect">
+            <a:avLst/>
+          </a:prstGeom>
+          <a:noFill/>
+        </p:spPr>
+        <p:txBody>
+          <a:bodyPr wrap="square" rtlCol="0">
+            <a:spAutoFit/>
+          </a:bodyPr>
+          <a:lstStyle/>
+          <a:p>
+            <a:r>
+              <a:rPr lang="ko-KR" altLang="en-US" dirty="0"/>
+              <a:t>유투브 </a:t>
+            </a:r>
+            <a:r>
+              <a:rPr lang="en-US" altLang="ko-KR" dirty="0"/>
+              <a:t>2</a:t>
+            </a:r>
+            <a:endParaRPr lang="ko-KR" altLang="en-US" dirty="0"/>
+          </a:p>
+        </p:txBody>
+      </p:sp>
+      <p:sp>
+        <p:nvSpPr>
+          <p:cNvPr id="13" name="TextBox 12">
+            <a:extLst>
+              <a:ext uri="{FF2B5EF4-FFF2-40B4-BE49-F238E27FC236}">
+                <a16:creationId xmlns:a16="http://schemas.microsoft.com/office/drawing/2014/main" id="{0699063E-7DEA-ACDA-57F1-D1569633AC31}"/>
+              </a:ext>
+            </a:extLst>
+          </p:cNvPr>
+          <p:cNvSpPr txBox="1"/>
+          <p:nvPr/>
+        </p:nvSpPr>
+        <p:spPr>
+          <a:xfrm>
+            <a:off x="8719279" y="5483688"/>
+            <a:ext cx="1221698" cy="369332"/>
+          </a:xfrm>
+          <a:prstGeom prst="rect">
+            <a:avLst/>
+          </a:prstGeom>
+          <a:noFill/>
+        </p:spPr>
+        <p:txBody>
+          <a:bodyPr wrap="square" rtlCol="0">
+            <a:spAutoFit/>
+          </a:bodyPr>
+          <a:lstStyle/>
+          <a:p>
+            <a:r>
+              <a:rPr lang="ko-KR" altLang="en-US" dirty="0"/>
+              <a:t>유투브 </a:t>
+            </a:r>
+            <a:r>
+              <a:rPr lang="en-US" altLang="ko-KR" dirty="0"/>
+              <a:t>3</a:t>
+            </a:r>
+            <a:endParaRPr lang="ko-KR" altLang="en-US" dirty="0"/>
+          </a:p>
+        </p:txBody>
+      </p:sp>
+    </p:spTree>
+    <p:extLst>
+      <p:ext uri="{BB962C8B-B14F-4D97-AF65-F5344CB8AC3E}">
+        <p14:creationId xmlns:p14="http://schemas.microsoft.com/office/powerpoint/2010/main" val="2489982740"/>
+      </p:ext>
+    </p:extLst>
+  </p:cSld>
+  <p:clrMapOvr>
+    <a:masterClrMapping/>
+  </p:clrMapOvr>
+</p:sld>
+</file>
+
+<file path=ppt/slides/slide7.xml><?xml version="1.0" encoding="utf-8"?>
+<p:sld xmlns:a="http://schemas.openxmlformats.org/drawingml/2006/main" xmlns:r="http://schemas.openxmlformats.org/officeDocument/2006/relationships" xmlns:p="http://schemas.openxmlformats.org/presentationml/2006/main">
+  <p:cSld>
+    <p:spTree>
+      <p:nvGrpSpPr>
+        <p:cNvPr id="1" name=""/>
+        <p:cNvGrpSpPr/>
+        <p:nvPr/>
+      </p:nvGrpSpPr>
+      <p:grpSpPr>
+        <a:xfrm>
+          <a:off x="0" y="0"/>
+          <a:ext cx="0" cy="0"/>
+          <a:chOff x="0" y="0"/>
+          <a:chExt cx="0" cy="0"/>
+        </a:xfrm>
+      </p:grpSpPr>
+      <p:sp>
+        <p:nvSpPr>
+          <p:cNvPr id="2" name="제목 1">
+            <a:extLst>
+              <a:ext uri="{FF2B5EF4-FFF2-40B4-BE49-F238E27FC236}">
+                <a16:creationId xmlns:a16="http://schemas.microsoft.com/office/drawing/2014/main" id="{CF1D55A8-E0DB-59D3-725B-D21E407719CD}"/>
+              </a:ext>
+            </a:extLst>
+          </p:cNvPr>
+          <p:cNvSpPr>
+            <a:spLocks noGrp="1"/>
+          </p:cNvSpPr>
+          <p:nvPr>
+            <p:ph type="title"/>
+          </p:nvPr>
+        </p:nvSpPr>
+        <p:spPr/>
+        <p:txBody>
+          <a:bodyPr/>
+          <a:lstStyle/>
+          <a:p>
+            <a:r>
+              <a:rPr lang="ko-KR" altLang="en-US" dirty="0"/>
+              <a:t>부가기능 </a:t>
+            </a:r>
+            <a:r>
+              <a:rPr lang="en-US" altLang="ko-KR" dirty="0"/>
+              <a:t>– SNS</a:t>
+            </a:r>
+            <a:r>
+              <a:rPr lang="ko-KR" altLang="en-US" dirty="0"/>
+              <a:t>와 연동</a:t>
+            </a:r>
+          </a:p>
+        </p:txBody>
+      </p:sp>
+      <p:sp>
+        <p:nvSpPr>
+          <p:cNvPr id="3" name="내용 개체 틀 2">
+            <a:extLst>
+              <a:ext uri="{FF2B5EF4-FFF2-40B4-BE49-F238E27FC236}">
+                <a16:creationId xmlns:a16="http://schemas.microsoft.com/office/drawing/2014/main" id="{40CD0608-3AFC-E99B-3908-8EBFF660CB9D}"/>
+              </a:ext>
+            </a:extLst>
+          </p:cNvPr>
+          <p:cNvSpPr>
+            <a:spLocks noGrp="1"/>
+          </p:cNvSpPr>
+          <p:nvPr>
+            <p:ph idx="1"/>
+          </p:nvPr>
+        </p:nvSpPr>
+        <p:spPr/>
+        <p:txBody>
+          <a:bodyPr/>
+          <a:lstStyle/>
+          <a:p>
+            <a:r>
+              <a:rPr lang="en-US" altLang="ko-KR" dirty="0"/>
+              <a:t>????</a:t>
+            </a:r>
+            <a:endParaRPr lang="ko-KR" altLang="en-US" dirty="0"/>
+          </a:p>
+        </p:txBody>
+      </p:sp>
+    </p:spTree>
+    <p:extLst>
+      <p:ext uri="{BB962C8B-B14F-4D97-AF65-F5344CB8AC3E}">
+        <p14:creationId xmlns:p14="http://schemas.microsoft.com/office/powerpoint/2010/main" val="1043858119"/>
       </p:ext>
     </p:extLst>
   </p:cSld>

</xml_diff>